<commit_message>
Set h background to match float type
</commit_message>
<xml_diff>
--- a/images/BJData_Diagram.pptx
+++ b/images/BJData_Diagram.pptx
@@ -3398,7 +3398,7 @@
           <p:nvPr>
             <p:extLst>
               <p:ext uri="{D42A27DB-BD31-4B8C-83A1-F6EECF244321}">
-                <p14:modId xmlns:p14="http://schemas.microsoft.com/office/powerpoint/2010/main" val="422713620"/>
+                <p14:modId xmlns:p14="http://schemas.microsoft.com/office/powerpoint/2010/main" val="712077280"/>
               </p:ext>
             </p:extLst>
           </p:nvPr>
@@ -5476,7 +5476,7 @@
                   </a:txBody>
                   <a:tcPr marL="91450" marR="91450" marT="45725" marB="45725">
                     <a:solidFill>
-                      <a:srgbClr val="EEC4A0"/>
+                      <a:srgbClr val="FEED99"/>
                     </a:solidFill>
                   </a:tcPr>
                 </a:tc>
@@ -5510,7 +5510,7 @@
                   </a:txBody>
                   <a:tcPr marL="91450" marR="91450" marT="45725" marB="45725">
                     <a:solidFill>
-                      <a:srgbClr val="EEC4A0"/>
+                      <a:srgbClr val="FEED99"/>
                     </a:solidFill>
                   </a:tcPr>
                 </a:tc>
@@ -5544,7 +5544,7 @@
                   </a:txBody>
                   <a:tcPr marL="91450" marR="91450" marT="45725" marB="45725">
                     <a:solidFill>
-                      <a:srgbClr val="EEC4A0"/>
+                      <a:srgbClr val="FEED99"/>
                     </a:solidFill>
                   </a:tcPr>
                 </a:tc>
@@ -5578,7 +5578,7 @@
                   </a:txBody>
                   <a:tcPr marL="91450" marR="91450" marT="45725" marB="45725">
                     <a:solidFill>
-                      <a:srgbClr val="EEC4A0"/>
+                      <a:srgbClr val="FEED99"/>
                     </a:solidFill>
                   </a:tcPr>
                 </a:tc>

</xml_diff>